<commit_message>
Update Minimum Enclosing Ball for FW_Updated.pptx
</commit_message>
<xml_diff>
--- a/Theory/Minimum Enclosing Ball for FW_Updated.pptx
+++ b/Theory/Minimum Enclosing Ball for FW_Updated.pptx
@@ -15948,7 +15948,7 @@
             <p:ph sz="quarter" idx="16"/>
             <p:extLst>
               <p:ext uri="{D42A27DB-BD31-4B8C-83A1-F6EECF244321}">
-                <p14:modId xmlns:p14="http://schemas.microsoft.com/office/powerpoint/2010/main" val="3178805652"/>
+                <p14:modId xmlns:p14="http://schemas.microsoft.com/office/powerpoint/2010/main" val="1351123716"/>
               </p:ext>
             </p:extLst>
           </p:nvPr>
@@ -16396,7 +16396,7 @@
                           </a:solidFill>
                           <a:effectLst/>
                         </a:rPr>
-                        <a:t>ITTERATIONS</a:t>
+                        <a:t>ITERATIONS</a:t>
                       </a:r>
                       <a:endParaRPr lang="en-US" sz="2000" b="1" i="0" u="none" strike="noStrike" dirty="0">
                         <a:solidFill>
@@ -19364,7 +19364,7 @@
             <p:ph sz="quarter" idx="16"/>
             <p:extLst>
               <p:ext uri="{D42A27DB-BD31-4B8C-83A1-F6EECF244321}">
-                <p14:modId xmlns:p14="http://schemas.microsoft.com/office/powerpoint/2010/main" val="860288425"/>
+                <p14:modId xmlns:p14="http://schemas.microsoft.com/office/powerpoint/2010/main" val="2974661516"/>
               </p:ext>
             </p:extLst>
           </p:nvPr>
@@ -19797,7 +19797,7 @@
                           </a:solidFill>
                           <a:effectLst/>
                         </a:rPr>
-                        <a:t>ITTERATIONS</a:t>
+                        <a:t>ITERATIONS</a:t>
                       </a:r>
                       <a:endParaRPr lang="en-US" sz="2000" b="1" i="0" u="none" strike="noStrike" dirty="0">
                         <a:solidFill>
@@ -23025,7 +23025,7 @@
             <p:ph sz="quarter" idx="16"/>
             <p:extLst>
               <p:ext uri="{D42A27DB-BD31-4B8C-83A1-F6EECF244321}">
-                <p14:modId xmlns:p14="http://schemas.microsoft.com/office/powerpoint/2010/main" val="3593939943"/>
+                <p14:modId xmlns:p14="http://schemas.microsoft.com/office/powerpoint/2010/main" val="2623240480"/>
               </p:ext>
             </p:extLst>
           </p:nvPr>
@@ -23694,7 +23694,7 @@
                           </a:solidFill>
                           <a:effectLst/>
                         </a:rPr>
-                        <a:t>ITTERATIONS</a:t>
+                        <a:t>ITERATIONS</a:t>
                       </a:r>
                       <a:endParaRPr lang="en-US" sz="1600" b="1" i="0" u="none" strike="noStrike" dirty="0">
                         <a:solidFill>
@@ -30744,7 +30744,7 @@
             <p:ph sz="quarter" idx="16"/>
             <p:extLst>
               <p:ext uri="{D42A27DB-BD31-4B8C-83A1-F6EECF244321}">
-                <p14:modId xmlns:p14="http://schemas.microsoft.com/office/powerpoint/2010/main" val="3336847257"/>
+                <p14:modId xmlns:p14="http://schemas.microsoft.com/office/powerpoint/2010/main" val="2538454836"/>
               </p:ext>
             </p:extLst>
           </p:nvPr>
@@ -31296,15 +31296,20 @@
                     <a:p>
                       <a:pPr algn="ctr" fontAlgn="b"/>
                       <a:r>
-                        <a:rPr lang="en-US" sz="1600" b="1" i="0" u="none" strike="noStrike" dirty="0">
+                        <a:rPr lang="en-GB" sz="1600" b="1" dirty="0">
                           <a:solidFill>
                             <a:schemeClr val="bg1"/>
                           </a:solidFill>
-                          <a:effectLst/>
-                          <a:latin typeface="+mn-lt"/>
                         </a:rPr>
-                        <a:t>EPSILON</a:t>
+                        <a:t>ε</a:t>
                       </a:r>
+                      <a:endParaRPr lang="en-US" sz="1600" b="1" i="0" u="none" strike="noStrike" dirty="0">
+                        <a:solidFill>
+                          <a:schemeClr val="bg1"/>
+                        </a:solidFill>
+                        <a:effectLst/>
+                        <a:latin typeface="+mn-lt"/>
+                      </a:endParaRPr>
                     </a:p>
                   </a:txBody>
                   <a:tcPr marL="76261" marR="76261" marT="38130" marB="38130" anchor="ctr">
@@ -31366,7 +31371,7 @@
                           </a:solidFill>
                           <a:effectLst/>
                         </a:rPr>
-                        <a:t>ITTERATIONS</a:t>
+                        <a:t>ITERATIONS</a:t>
                       </a:r>
                       <a:endParaRPr lang="en-US" sz="1600" b="1" i="0" u="none" strike="noStrike" dirty="0">
                         <a:solidFill>
@@ -37927,19 +37932,32 @@
         <p:spPr>
           <a:xfrm>
             <a:off x="649098" y="672354"/>
-            <a:ext cx="3171825" cy="579352"/>
+            <a:ext cx="4118211" cy="579352"/>
           </a:xfrm>
         </p:spPr>
         <p:txBody>
           <a:bodyPr>
-            <a:normAutofit/>
+            <a:normAutofit fontScale="90000"/>
           </a:bodyPr>
           <a:lstStyle/>
           <a:p>
             <a:r>
               <a:rPr lang="en-US" dirty="0"/>
-              <a:t>introduction</a:t>
+              <a:t>Introduction - </a:t>
             </a:r>
+            <a:r>
+              <a:rPr lang="en-US" dirty="0" err="1">
+                <a:solidFill>
+                  <a:srgbClr val="FF0000"/>
+                </a:solidFill>
+              </a:rPr>
+              <a:t>dejan</a:t>
+            </a:r>
+            <a:endParaRPr lang="en-US" dirty="0">
+              <a:solidFill>
+                <a:srgbClr val="FF0000"/>
+              </a:solidFill>
+            </a:endParaRPr>
           </a:p>
         </p:txBody>
       </p:sp>
@@ -38102,24 +38120,6 @@
               </a:rPr>
               <a:t>We will implement 3 algorithms with the goal of solving the MEB problem and we will test them on artificial and real-world datasets for detecting anomalies. Finally, we will compare our results. </a:t>
             </a:r>
-            <a:r>
-              <a:rPr lang="en-US" sz="1800" i="1" dirty="0" err="1">
-                <a:solidFill>
-                  <a:srgbClr val="FF0000"/>
-                </a:solidFill>
-                <a:effectLst/>
-                <a:latin typeface="+mj-lt"/>
-                <a:ea typeface="Calibri" panose="020F0502020204030204" pitchFamily="34" charset="0"/>
-                <a:cs typeface="Times New Roman" panose="02020603050405020304" pitchFamily="18" charset="0"/>
-              </a:rPr>
-              <a:t>Dejan</a:t>
-            </a:r>
-            <a:endParaRPr lang="en-US" sz="1800" i="1" dirty="0">
-              <a:effectLst/>
-              <a:latin typeface="+mj-lt"/>
-              <a:ea typeface="Calibri" panose="020F0502020204030204" pitchFamily="34" charset="0"/>
-              <a:cs typeface="Times New Roman" panose="02020603050405020304" pitchFamily="18" charset="0"/>
-            </a:endParaRPr>
           </a:p>
         </p:txBody>
       </p:sp>
@@ -40290,20 +40290,33 @@
         </p:nvSpPr>
         <p:spPr>
           <a:xfrm>
-            <a:off x="8136620" y="487612"/>
-            <a:ext cx="2674254" cy="585788"/>
+            <a:off x="6906827" y="487612"/>
+            <a:ext cx="3904047" cy="585788"/>
           </a:xfrm>
         </p:spPr>
         <p:txBody>
           <a:bodyPr>
-            <a:normAutofit/>
+            <a:normAutofit fontScale="90000"/>
           </a:bodyPr>
           <a:lstStyle/>
           <a:p>
             <a:r>
               <a:rPr lang="en-US" dirty="0"/>
-              <a:t>algorithms</a:t>
+              <a:t>Algorithms - </a:t>
             </a:r>
+            <a:r>
+              <a:rPr lang="en-US" dirty="0" err="1">
+                <a:solidFill>
+                  <a:srgbClr val="FF0000"/>
+                </a:solidFill>
+              </a:rPr>
+              <a:t>marija</a:t>
+            </a:r>
+            <a:endParaRPr lang="en-US" dirty="0">
+              <a:solidFill>
+                <a:srgbClr val="FF0000"/>
+              </a:solidFill>
+            </a:endParaRPr>
           </a:p>
         </p:txBody>
       </p:sp>
@@ -40697,16 +40710,13 @@
           <a:p>
             <a:r>
               <a:rPr lang="en-US" sz="1600" dirty="0"/>
-              <a:t>Adaptation of the standard FW to the MEB problem. It generates a sequence of increasing balls until a ball with desired properties is computed. </a:t>
+              <a:t>Adaptation of the standard FW to the MEB problem. It generates a sequence of increasing balls until a ball with desired properties is computed.</a:t>
             </a:r>
-            <a:r>
-              <a:rPr lang="en-US" sz="1600" dirty="0">
-                <a:solidFill>
-                  <a:srgbClr val="FF0000"/>
-                </a:solidFill>
-              </a:rPr>
-              <a:t>Marija</a:t>
-            </a:r>
+            <a:endParaRPr lang="en-US" sz="1600" dirty="0">
+              <a:solidFill>
+                <a:srgbClr val="FF0000"/>
+              </a:solidFill>
+            </a:endParaRPr>
           </a:p>
         </p:txBody>
       </p:sp>
@@ -43287,8 +43297,21 @@
           <a:p>
             <a:r>
               <a:rPr lang="en-US" dirty="0"/>
-              <a:t>EXPERIMENTS</a:t>
+              <a:t>EXPERIMENTS - </a:t>
             </a:r>
+            <a:r>
+              <a:rPr lang="en-US" dirty="0" err="1">
+                <a:solidFill>
+                  <a:srgbClr val="FF0000"/>
+                </a:solidFill>
+              </a:rPr>
+              <a:t>suleyman</a:t>
+            </a:r>
+            <a:endParaRPr lang="en-US" dirty="0">
+              <a:solidFill>
+                <a:srgbClr val="FF0000"/>
+              </a:solidFill>
+            </a:endParaRPr>
           </a:p>
         </p:txBody>
       </p:sp>
@@ -43911,25 +43934,8 @@
                 <a:effectLst/>
                 <a:ea typeface="Calibri" panose="020F0502020204030204" pitchFamily="34" charset="0"/>
               </a:rPr>
-              <a:t>Hyperparameter: epsilon (ε) – stopping criteria - </a:t>
+              <a:t>Hyperparameter: epsilon (ε) – stopping criteria</a:t>
             </a:r>
-            <a:r>
-              <a:rPr lang="en-US" sz="2400" dirty="0">
-                <a:solidFill>
-                  <a:srgbClr val="FF0000"/>
-                </a:solidFill>
-                <a:effectLst/>
-                <a:ea typeface="Calibri" panose="020F0502020204030204" pitchFamily="34" charset="0"/>
-              </a:rPr>
-              <a:t>Suleyman</a:t>
-            </a:r>
-          </a:p>
-          <a:p>
-            <a:pPr algn="l"/>
-            <a:endParaRPr lang="en-US" sz="2400" dirty="0">
-              <a:effectLst/>
-              <a:ea typeface="Calibri" panose="020F0502020204030204" pitchFamily="34" charset="0"/>
-            </a:endParaRPr>
           </a:p>
           <a:p>
             <a:pPr marL="285750" indent="-285750" algn="l">
@@ -44751,15 +44757,6 @@
 </file>
 
 <file path=customXml/item1.xml><?xml version="1.0" encoding="utf-8"?>
-<?mso-contentType ?>
-<FormTemplates xmlns="http://schemas.microsoft.com/sharepoint/v3/contenttype/forms">
-  <Display>DocumentLibraryForm</Display>
-  <Edit>DocumentLibraryForm</Edit>
-  <New>DocumentLibraryForm</New>
-</FormTemplates>
-</file>
-
-<file path=customXml/item2.xml><?xml version="1.0" encoding="utf-8"?>
 <p:properties xmlns:p="http://schemas.microsoft.com/office/2006/metadata/properties" xmlns:xsi="http://www.w3.org/2001/XMLSchema-instance" xmlns:pc="http://schemas.microsoft.com/office/infopath/2007/PartnerControls">
   <documentManagement>
     <_ip_UnifiedCompliancePolicyUIAction xmlns="http://schemas.microsoft.com/sharepoint/v3" xsi:nil="true"/>
@@ -44777,6 +44774,15 @@
     <MediaServiceKeyPoints xmlns="71af3243-3dd4-4a8d-8c0d-dd76da1f02a5" xsi:nil="true"/>
   </documentManagement>
 </p:properties>
+</file>
+
+<file path=customXml/item2.xml><?xml version="1.0" encoding="utf-8"?>
+<?mso-contentType ?>
+<FormTemplates xmlns="http://schemas.microsoft.com/sharepoint/v3/contenttype/forms">
+  <Display>DocumentLibraryForm</Display>
+  <Edit>DocumentLibraryForm</Edit>
+  <New>DocumentLibraryForm</New>
+</FormTemplates>
 </file>
 
 <file path=customXml/item3.xml><?xml version="1.0" encoding="utf-8"?>
@@ -45086,14 +45092,6 @@
 </file>
 
 <file path=customXml/itemProps1.xml><?xml version="1.0" encoding="utf-8"?>
-<ds:datastoreItem xmlns:ds="http://schemas.openxmlformats.org/officeDocument/2006/customXml" ds:itemID="{79BF405E-7930-4D5C-ABB3-493E9D6D6CEA}">
-  <ds:schemaRefs>
-    <ds:schemaRef ds:uri="http://schemas.microsoft.com/sharepoint/v3/contenttype/forms"/>
-  </ds:schemaRefs>
-</ds:datastoreItem>
-</file>
-
-<file path=customXml/itemProps2.xml><?xml version="1.0" encoding="utf-8"?>
 <ds:datastoreItem xmlns:ds="http://schemas.openxmlformats.org/officeDocument/2006/customXml" ds:itemID="{6EA97235-BEC4-4F82-87A8-2F5DAD53B5F9}">
   <ds:schemaRefs>
     <ds:schemaRef ds:uri="http://schemas.microsoft.com/office/2006/metadata/properties"/>
@@ -45101,6 +45099,14 @@
     <ds:schemaRef ds:uri="http://schemas.microsoft.com/sharepoint/v3"/>
     <ds:schemaRef ds:uri="71af3243-3dd4-4a8d-8c0d-dd76da1f02a5"/>
     <ds:schemaRef ds:uri="230e9df3-be65-4c73-a93b-d1236ebd677e"/>
+  </ds:schemaRefs>
+</ds:datastoreItem>
+</file>
+
+<file path=customXml/itemProps2.xml><?xml version="1.0" encoding="utf-8"?>
+<ds:datastoreItem xmlns:ds="http://schemas.openxmlformats.org/officeDocument/2006/customXml" ds:itemID="{79BF405E-7930-4D5C-ABB3-493E9D6D6CEA}">
+  <ds:schemaRefs>
+    <ds:schemaRef ds:uri="http://schemas.microsoft.com/sharepoint/v3/contenttype/forms"/>
   </ds:schemaRefs>
 </ds:datastoreItem>
 </file>

</xml_diff>